<commit_message>
Changes to PP Presentation
</commit_message>
<xml_diff>
--- a/STACK Lecture.pptx
+++ b/STACK Lecture.pptx
@@ -196,14 +196,14 @@
           <a:effectLst/>
           <a:extLst>
             <a:ext uri="{909E8E84-426E-40dd-AFC4-6F175D3DCCD1}">
-              <a14:hiddenFill xmlns:a14="http://schemas.microsoft.com/office/drawing/2010/main" xmlns="">
+              <a14:hiddenFill xmlns="" xmlns:a14="http://schemas.microsoft.com/office/drawing/2010/main">
                 <a:solidFill>
                   <a:schemeClr val="accent1"/>
                 </a:solidFill>
               </a14:hiddenFill>
             </a:ext>
             <a:ext uri="{91240B29-F687-4f45-9708-019B960494DF}">
-              <a14:hiddenLine xmlns:a14="http://schemas.microsoft.com/office/drawing/2010/main" xmlns="" w="9525">
+              <a14:hiddenLine xmlns="" xmlns:a14="http://schemas.microsoft.com/office/drawing/2010/main" w="9525">
                 <a:solidFill>
                   <a:schemeClr val="tx1"/>
                 </a:solidFill>
@@ -213,7 +213,7 @@
               </a14:hiddenLine>
             </a:ext>
             <a:ext uri="{AF507438-7753-43e0-B8FC-AC1667EBCBE1}">
-              <a14:hiddenEffects xmlns:a14="http://schemas.microsoft.com/office/drawing/2010/main" xmlns="">
+              <a14:hiddenEffects xmlns="" xmlns:a14="http://schemas.microsoft.com/office/drawing/2010/main">
                 <a:effectLst>
                   <a:outerShdw dist="35921" dir="2700000" algn="ctr" rotWithShape="0">
                     <a:schemeClr val="bg2"/>
@@ -264,14 +264,14 @@
           <a:effectLst/>
           <a:extLst>
             <a:ext uri="{909E8E84-426E-40dd-AFC4-6F175D3DCCD1}">
-              <a14:hiddenFill xmlns:a14="http://schemas.microsoft.com/office/drawing/2010/main" xmlns="">
+              <a14:hiddenFill xmlns="" xmlns:a14="http://schemas.microsoft.com/office/drawing/2010/main">
                 <a:solidFill>
                   <a:schemeClr val="accent1"/>
                 </a:solidFill>
               </a14:hiddenFill>
             </a:ext>
             <a:ext uri="{91240B29-F687-4f45-9708-019B960494DF}">
-              <a14:hiddenLine xmlns:a14="http://schemas.microsoft.com/office/drawing/2010/main" xmlns="" w="9525">
+              <a14:hiddenLine xmlns="" xmlns:a14="http://schemas.microsoft.com/office/drawing/2010/main" w="9525">
                 <a:solidFill>
                   <a:schemeClr val="tx1"/>
                 </a:solidFill>
@@ -281,7 +281,7 @@
               </a14:hiddenLine>
             </a:ext>
             <a:ext uri="{AF507438-7753-43e0-B8FC-AC1667EBCBE1}">
-              <a14:hiddenEffects xmlns:a14="http://schemas.microsoft.com/office/drawing/2010/main" xmlns="">
+              <a14:hiddenEffects xmlns="" xmlns:a14="http://schemas.microsoft.com/office/drawing/2010/main">
                 <a:effectLst>
                   <a:outerShdw dist="35921" dir="2700000" algn="ctr" rotWithShape="0">
                     <a:schemeClr val="bg2"/>
@@ -332,14 +332,14 @@
           <a:effectLst/>
           <a:extLst>
             <a:ext uri="{909E8E84-426E-40dd-AFC4-6F175D3DCCD1}">
-              <a14:hiddenFill xmlns:a14="http://schemas.microsoft.com/office/drawing/2010/main" xmlns="">
+              <a14:hiddenFill xmlns="" xmlns:a14="http://schemas.microsoft.com/office/drawing/2010/main">
                 <a:solidFill>
                   <a:schemeClr val="accent1"/>
                 </a:solidFill>
               </a14:hiddenFill>
             </a:ext>
             <a:ext uri="{91240B29-F687-4f45-9708-019B960494DF}">
-              <a14:hiddenLine xmlns:a14="http://schemas.microsoft.com/office/drawing/2010/main" xmlns="" w="9525">
+              <a14:hiddenLine xmlns="" xmlns:a14="http://schemas.microsoft.com/office/drawing/2010/main" w="9525">
                 <a:solidFill>
                   <a:schemeClr val="tx1"/>
                 </a:solidFill>
@@ -349,7 +349,7 @@
               </a14:hiddenLine>
             </a:ext>
             <a:ext uri="{AF507438-7753-43e0-B8FC-AC1667EBCBE1}">
-              <a14:hiddenEffects xmlns:a14="http://schemas.microsoft.com/office/drawing/2010/main" xmlns="">
+              <a14:hiddenEffects xmlns="" xmlns:a14="http://schemas.microsoft.com/office/drawing/2010/main">
                 <a:effectLst>
                   <a:outerShdw dist="35921" dir="2700000" algn="ctr" rotWithShape="0">
                     <a:schemeClr val="bg2"/>
@@ -400,14 +400,14 @@
           <a:effectLst/>
           <a:extLst>
             <a:ext uri="{909E8E84-426E-40dd-AFC4-6F175D3DCCD1}">
-              <a14:hiddenFill xmlns:a14="http://schemas.microsoft.com/office/drawing/2010/main" xmlns="">
+              <a14:hiddenFill xmlns="" xmlns:a14="http://schemas.microsoft.com/office/drawing/2010/main">
                 <a:solidFill>
                   <a:schemeClr val="accent1"/>
                 </a:solidFill>
               </a14:hiddenFill>
             </a:ext>
             <a:ext uri="{91240B29-F687-4f45-9708-019B960494DF}">
-              <a14:hiddenLine xmlns:a14="http://schemas.microsoft.com/office/drawing/2010/main" xmlns="" w="9525">
+              <a14:hiddenLine xmlns="" xmlns:a14="http://schemas.microsoft.com/office/drawing/2010/main" w="9525">
                 <a:solidFill>
                   <a:schemeClr val="tx1"/>
                 </a:solidFill>
@@ -417,7 +417,7 @@
               </a14:hiddenLine>
             </a:ext>
             <a:ext uri="{AF507438-7753-43e0-B8FC-AC1667EBCBE1}">
-              <a14:hiddenEffects xmlns:a14="http://schemas.microsoft.com/office/drawing/2010/main" xmlns="">
+              <a14:hiddenEffects xmlns="" xmlns:a14="http://schemas.microsoft.com/office/drawing/2010/main">
                 <a:effectLst>
                   <a:outerShdw dist="35921" dir="2700000" algn="ctr" rotWithShape="0">
                     <a:schemeClr val="bg2"/>
@@ -451,7 +451,7 @@
     </p:spTree>
     <p:extLst>
       <p:ext uri="{BB962C8B-B14F-4D97-AF65-F5344CB8AC3E}">
-        <p14:creationId xmlns:p14="http://schemas.microsoft.com/office/powerpoint/2010/main" xmlns="" val="4216558189"/>
+        <p14:creationId xmlns="" xmlns:p14="http://schemas.microsoft.com/office/powerpoint/2010/main" val="4216558189"/>
       </p:ext>
     </p:extLst>
   </p:cSld>
@@ -509,14 +509,14 @@
           <a:effectLst/>
           <a:extLst>
             <a:ext uri="{909E8E84-426E-40dd-AFC4-6F175D3DCCD1}">
-              <a14:hiddenFill xmlns:a14="http://schemas.microsoft.com/office/drawing/2010/main" xmlns="">
+              <a14:hiddenFill xmlns="" xmlns:a14="http://schemas.microsoft.com/office/drawing/2010/main">
                 <a:solidFill>
                   <a:schemeClr val="accent1"/>
                 </a:solidFill>
               </a14:hiddenFill>
             </a:ext>
             <a:ext uri="{91240B29-F687-4f45-9708-019B960494DF}">
-              <a14:hiddenLine xmlns:a14="http://schemas.microsoft.com/office/drawing/2010/main" xmlns="" w="9525">
+              <a14:hiddenLine xmlns="" xmlns:a14="http://schemas.microsoft.com/office/drawing/2010/main" w="9525">
                 <a:solidFill>
                   <a:schemeClr val="tx1"/>
                 </a:solidFill>
@@ -526,7 +526,7 @@
               </a14:hiddenLine>
             </a:ext>
             <a:ext uri="{AF507438-7753-43e0-B8FC-AC1667EBCBE1}">
-              <a14:hiddenEffects xmlns:a14="http://schemas.microsoft.com/office/drawing/2010/main" xmlns="">
+              <a14:hiddenEffects xmlns="" xmlns:a14="http://schemas.microsoft.com/office/drawing/2010/main">
                 <a:effectLst>
                   <a:outerShdw dist="35921" dir="2700000" algn="ctr" rotWithShape="0">
                     <a:schemeClr val="bg2"/>
@@ -577,14 +577,14 @@
           <a:effectLst/>
           <a:extLst>
             <a:ext uri="{909E8E84-426E-40dd-AFC4-6F175D3DCCD1}">
-              <a14:hiddenFill xmlns:a14="http://schemas.microsoft.com/office/drawing/2010/main" xmlns="">
+              <a14:hiddenFill xmlns="" xmlns:a14="http://schemas.microsoft.com/office/drawing/2010/main">
                 <a:solidFill>
                   <a:schemeClr val="accent1"/>
                 </a:solidFill>
               </a14:hiddenFill>
             </a:ext>
             <a:ext uri="{91240B29-F687-4f45-9708-019B960494DF}">
-              <a14:hiddenLine xmlns:a14="http://schemas.microsoft.com/office/drawing/2010/main" xmlns="" w="9525">
+              <a14:hiddenLine xmlns="" xmlns:a14="http://schemas.microsoft.com/office/drawing/2010/main" w="9525">
                 <a:solidFill>
                   <a:schemeClr val="tx1"/>
                 </a:solidFill>
@@ -594,7 +594,7 @@
               </a14:hiddenLine>
             </a:ext>
             <a:ext uri="{AF507438-7753-43e0-B8FC-AC1667EBCBE1}">
-              <a14:hiddenEffects xmlns:a14="http://schemas.microsoft.com/office/drawing/2010/main" xmlns="">
+              <a14:hiddenEffects xmlns="" xmlns:a14="http://schemas.microsoft.com/office/drawing/2010/main">
                 <a:effectLst>
                   <a:outerShdw dist="35921" dir="2700000" algn="ctr" rotWithShape="0">
                     <a:schemeClr val="bg2"/>
@@ -650,7 +650,7 @@
           <a:effectLst/>
           <a:extLst>
             <a:ext uri="{AF507438-7753-43e0-B8FC-AC1667EBCBE1}">
-              <a14:hiddenEffects xmlns:a14="http://schemas.microsoft.com/office/drawing/2010/main" xmlns="">
+              <a14:hiddenEffects xmlns="" xmlns:a14="http://schemas.microsoft.com/office/drawing/2010/main">
                 <a:effectLst>
                   <a:outerShdw dist="35921" dir="2700000" algn="ctr" rotWithShape="0">
                     <a:srgbClr val="808080"/>
@@ -659,7 +659,7 @@
               </a14:hiddenEffects>
             </a:ext>
             <a:ext uri="{53640926-AAD7-44d8-BBD7-CCE9431645EC}">
-              <a14:shadowObscured xmlns:a14="http://schemas.microsoft.com/office/drawing/2010/main" xmlns="" val="1"/>
+              <a14:shadowObscured xmlns="" xmlns:a14="http://schemas.microsoft.com/office/drawing/2010/main" val="1"/>
             </a:ext>
           </a:extLst>
         </p:spPr>
@@ -689,14 +689,14 @@
           <a:effectLst/>
           <a:extLst>
             <a:ext uri="{909E8E84-426E-40dd-AFC4-6F175D3DCCD1}">
-              <a14:hiddenFill xmlns:a14="http://schemas.microsoft.com/office/drawing/2010/main" xmlns="">
+              <a14:hiddenFill xmlns="" xmlns:a14="http://schemas.microsoft.com/office/drawing/2010/main">
                 <a:solidFill>
                   <a:schemeClr val="accent1"/>
                 </a:solidFill>
               </a14:hiddenFill>
             </a:ext>
             <a:ext uri="{91240B29-F687-4f45-9708-019B960494DF}">
-              <a14:hiddenLine xmlns:a14="http://schemas.microsoft.com/office/drawing/2010/main" xmlns="" w="9525">
+              <a14:hiddenLine xmlns="" xmlns:a14="http://schemas.microsoft.com/office/drawing/2010/main" w="9525">
                 <a:solidFill>
                   <a:schemeClr val="tx1"/>
                 </a:solidFill>
@@ -706,7 +706,7 @@
               </a14:hiddenLine>
             </a:ext>
             <a:ext uri="{AF507438-7753-43e0-B8FC-AC1667EBCBE1}">
-              <a14:hiddenEffects xmlns:a14="http://schemas.microsoft.com/office/drawing/2010/main" xmlns="">
+              <a14:hiddenEffects xmlns="" xmlns:a14="http://schemas.microsoft.com/office/drawing/2010/main">
                 <a:effectLst>
                   <a:outerShdw dist="35921" dir="2700000" algn="ctr" rotWithShape="0">
                     <a:schemeClr val="bg2"/>
@@ -785,14 +785,14 @@
           <a:effectLst/>
           <a:extLst>
             <a:ext uri="{909E8E84-426E-40dd-AFC4-6F175D3DCCD1}">
-              <a14:hiddenFill xmlns:a14="http://schemas.microsoft.com/office/drawing/2010/main" xmlns="">
+              <a14:hiddenFill xmlns="" xmlns:a14="http://schemas.microsoft.com/office/drawing/2010/main">
                 <a:solidFill>
                   <a:schemeClr val="accent1"/>
                 </a:solidFill>
               </a14:hiddenFill>
             </a:ext>
             <a:ext uri="{91240B29-F687-4f45-9708-019B960494DF}">
-              <a14:hiddenLine xmlns:a14="http://schemas.microsoft.com/office/drawing/2010/main" xmlns="" w="9525">
+              <a14:hiddenLine xmlns="" xmlns:a14="http://schemas.microsoft.com/office/drawing/2010/main" w="9525">
                 <a:solidFill>
                   <a:schemeClr val="tx1"/>
                 </a:solidFill>
@@ -802,7 +802,7 @@
               </a14:hiddenLine>
             </a:ext>
             <a:ext uri="{AF507438-7753-43e0-B8FC-AC1667EBCBE1}">
-              <a14:hiddenEffects xmlns:a14="http://schemas.microsoft.com/office/drawing/2010/main" xmlns="">
+              <a14:hiddenEffects xmlns="" xmlns:a14="http://schemas.microsoft.com/office/drawing/2010/main">
                 <a:effectLst>
                   <a:outerShdw dist="35921" dir="2700000" algn="ctr" rotWithShape="0">
                     <a:schemeClr val="bg2"/>
@@ -853,14 +853,14 @@
           <a:effectLst/>
           <a:extLst>
             <a:ext uri="{909E8E84-426E-40dd-AFC4-6F175D3DCCD1}">
-              <a14:hiddenFill xmlns:a14="http://schemas.microsoft.com/office/drawing/2010/main" xmlns="">
+              <a14:hiddenFill xmlns="" xmlns:a14="http://schemas.microsoft.com/office/drawing/2010/main">
                 <a:solidFill>
                   <a:schemeClr val="accent1"/>
                 </a:solidFill>
               </a14:hiddenFill>
             </a:ext>
             <a:ext uri="{91240B29-F687-4f45-9708-019B960494DF}">
-              <a14:hiddenLine xmlns:a14="http://schemas.microsoft.com/office/drawing/2010/main" xmlns="" w="9525">
+              <a14:hiddenLine xmlns="" xmlns:a14="http://schemas.microsoft.com/office/drawing/2010/main" w="9525">
                 <a:solidFill>
                   <a:schemeClr val="tx1"/>
                 </a:solidFill>
@@ -870,7 +870,7 @@
               </a14:hiddenLine>
             </a:ext>
             <a:ext uri="{AF507438-7753-43e0-B8FC-AC1667EBCBE1}">
-              <a14:hiddenEffects xmlns:a14="http://schemas.microsoft.com/office/drawing/2010/main" xmlns="">
+              <a14:hiddenEffects xmlns="" xmlns:a14="http://schemas.microsoft.com/office/drawing/2010/main">
                 <a:effectLst>
                   <a:outerShdw dist="35921" dir="2700000" algn="ctr" rotWithShape="0">
                     <a:schemeClr val="bg2"/>
@@ -904,7 +904,7 @@
     </p:spTree>
     <p:extLst>
       <p:ext uri="{BB962C8B-B14F-4D97-AF65-F5344CB8AC3E}">
-        <p14:creationId xmlns:p14="http://schemas.microsoft.com/office/powerpoint/2010/main" xmlns="" val="3264842572"/>
+        <p14:creationId xmlns="" xmlns:p14="http://schemas.microsoft.com/office/powerpoint/2010/main" val="3264842572"/>
       </p:ext>
     </p:extLst>
   </p:cSld>
@@ -1163,7 +1163,7 @@
           </a:ln>
           <a:extLst>
             <a:ext uri="{91240B29-F687-4f45-9708-019B960494DF}">
-              <a14:hiddenLine xmlns:a14="http://schemas.microsoft.com/office/drawing/2010/main" xmlns="" w="9525">
+              <a14:hiddenLine xmlns="" xmlns:a14="http://schemas.microsoft.com/office/drawing/2010/main" w="9525">
                 <a:solidFill>
                   <a:schemeClr val="tx1"/>
                 </a:solidFill>
@@ -1206,7 +1206,7 @@
           </a:ln>
           <a:extLst>
             <a:ext uri="{91240B29-F687-4f45-9708-019B960494DF}">
-              <a14:hiddenLine xmlns:a14="http://schemas.microsoft.com/office/drawing/2010/main" xmlns="" w="9525">
+              <a14:hiddenLine xmlns="" xmlns:a14="http://schemas.microsoft.com/office/drawing/2010/main" w="9525">
                 <a:solidFill>
                   <a:schemeClr val="tx1"/>
                 </a:solidFill>
@@ -1242,7 +1242,7 @@
           </a:xfrm>
           <a:extLst>
             <a:ext uri="{91240B29-F687-4f45-9708-019B960494DF}">
-              <a14:hiddenLine xmlns:a14="http://schemas.microsoft.com/office/drawing/2010/main" xmlns="" w="9525">
+              <a14:hiddenLine xmlns="" xmlns:a14="http://schemas.microsoft.com/office/drawing/2010/main" w="9525">
                 <a:solidFill>
                   <a:schemeClr val="tx1"/>
                 </a:solidFill>
@@ -1363,7 +1363,7 @@
           <a:blip r:embed="rId3" cstate="print">
             <a:extLst>
               <a:ext uri="{28A0092B-C50C-407E-A947-70E740481C1C}">
-                <a14:useLocalDpi xmlns:a14="http://schemas.microsoft.com/office/drawing/2010/main" xmlns="" val="0"/>
+                <a14:useLocalDpi xmlns="" xmlns:a14="http://schemas.microsoft.com/office/drawing/2010/main" val="0"/>
               </a:ext>
             </a:extLst>
           </a:blip>
@@ -1383,7 +1383,7 @@
           <a:noFill/>
           <a:extLst>
             <a:ext uri="{909E8E84-426E-40dd-AFC4-6F175D3DCCD1}">
-              <a14:hiddenFill xmlns:a14="http://schemas.microsoft.com/office/drawing/2010/main" xmlns="">
+              <a14:hiddenFill xmlns="" xmlns:a14="http://schemas.microsoft.com/office/drawing/2010/main">
                 <a:solidFill>
                   <a:srgbClr val="FFFFFF"/>
                 </a:solidFill>
@@ -1669,7 +1669,7 @@
     </p:spTree>
     <p:extLst>
       <p:ext uri="{BB962C8B-B14F-4D97-AF65-F5344CB8AC3E}">
-        <p14:creationId xmlns:p14="http://schemas.microsoft.com/office/powerpoint/2010/main" xmlns="" val="344780221"/>
+        <p14:creationId xmlns="" xmlns:p14="http://schemas.microsoft.com/office/powerpoint/2010/main" val="344780221"/>
       </p:ext>
     </p:extLst>
   </p:cSld>
@@ -1842,7 +1842,7 @@
     </p:spTree>
     <p:extLst>
       <p:ext uri="{BB962C8B-B14F-4D97-AF65-F5344CB8AC3E}">
-        <p14:creationId xmlns:p14="http://schemas.microsoft.com/office/powerpoint/2010/main" xmlns="" val="3935786689"/>
+        <p14:creationId xmlns="" xmlns:p14="http://schemas.microsoft.com/office/powerpoint/2010/main" val="3935786689"/>
       </p:ext>
     </p:extLst>
   </p:cSld>
@@ -2005,7 +2005,7 @@
     </p:spTree>
     <p:extLst>
       <p:ext uri="{BB962C8B-B14F-4D97-AF65-F5344CB8AC3E}">
-        <p14:creationId xmlns:p14="http://schemas.microsoft.com/office/powerpoint/2010/main" xmlns="" val="257853392"/>
+        <p14:creationId xmlns="" xmlns:p14="http://schemas.microsoft.com/office/powerpoint/2010/main" val="257853392"/>
       </p:ext>
     </p:extLst>
   </p:cSld>
@@ -2190,7 +2190,7 @@
     </p:spTree>
     <p:extLst>
       <p:ext uri="{BB962C8B-B14F-4D97-AF65-F5344CB8AC3E}">
-        <p14:creationId xmlns:p14="http://schemas.microsoft.com/office/powerpoint/2010/main" xmlns="" val="3940132783"/>
+        <p14:creationId xmlns="" xmlns:p14="http://schemas.microsoft.com/office/powerpoint/2010/main" val="3940132783"/>
       </p:ext>
     </p:extLst>
   </p:cSld>
@@ -2471,7 +2471,7 @@
     </p:spTree>
     <p:extLst>
       <p:ext uri="{BB962C8B-B14F-4D97-AF65-F5344CB8AC3E}">
-        <p14:creationId xmlns:p14="http://schemas.microsoft.com/office/powerpoint/2010/main" xmlns="" val="1655035711"/>
+        <p14:creationId xmlns="" xmlns:p14="http://schemas.microsoft.com/office/powerpoint/2010/main" val="1655035711"/>
       </p:ext>
     </p:extLst>
   </p:cSld>
@@ -2891,7 +2891,7 @@
     </p:spTree>
     <p:extLst>
       <p:ext uri="{BB962C8B-B14F-4D97-AF65-F5344CB8AC3E}">
-        <p14:creationId xmlns:p14="http://schemas.microsoft.com/office/powerpoint/2010/main" xmlns="" val="1412532674"/>
+        <p14:creationId xmlns="" xmlns:p14="http://schemas.microsoft.com/office/powerpoint/2010/main" val="1412532674"/>
       </p:ext>
     </p:extLst>
   </p:cSld>
@@ -3002,7 +3002,7 @@
     </p:spTree>
     <p:extLst>
       <p:ext uri="{BB962C8B-B14F-4D97-AF65-F5344CB8AC3E}">
-        <p14:creationId xmlns:p14="http://schemas.microsoft.com/office/powerpoint/2010/main" xmlns="" val="781189041"/>
+        <p14:creationId xmlns="" xmlns:p14="http://schemas.microsoft.com/office/powerpoint/2010/main" val="781189041"/>
       </p:ext>
     </p:extLst>
   </p:cSld>
@@ -3090,7 +3090,7 @@
     </p:spTree>
     <p:extLst>
       <p:ext uri="{BB962C8B-B14F-4D97-AF65-F5344CB8AC3E}">
-        <p14:creationId xmlns:p14="http://schemas.microsoft.com/office/powerpoint/2010/main" xmlns="" val="1153199924"/>
+        <p14:creationId xmlns="" xmlns:p14="http://schemas.microsoft.com/office/powerpoint/2010/main" val="1153199924"/>
       </p:ext>
     </p:extLst>
   </p:cSld>
@@ -3360,7 +3360,7 @@
     </p:spTree>
     <p:extLst>
       <p:ext uri="{BB962C8B-B14F-4D97-AF65-F5344CB8AC3E}">
-        <p14:creationId xmlns:p14="http://schemas.microsoft.com/office/powerpoint/2010/main" xmlns="" val="2918190207"/>
+        <p14:creationId xmlns="" xmlns:p14="http://schemas.microsoft.com/office/powerpoint/2010/main" val="2918190207"/>
       </p:ext>
     </p:extLst>
   </p:cSld>
@@ -3606,7 +3606,7 @@
     </p:spTree>
     <p:extLst>
       <p:ext uri="{BB962C8B-B14F-4D97-AF65-F5344CB8AC3E}">
-        <p14:creationId xmlns:p14="http://schemas.microsoft.com/office/powerpoint/2010/main" xmlns="" val="2238771054"/>
+        <p14:creationId xmlns="" xmlns:p14="http://schemas.microsoft.com/office/powerpoint/2010/main" val="2238771054"/>
       </p:ext>
     </p:extLst>
   </p:cSld>
@@ -3668,7 +3668,7 @@
           </a:ln>
           <a:extLst>
             <a:ext uri="{91240B29-F687-4f45-9708-019B960494DF}">
-              <a14:hiddenLine xmlns:a14="http://schemas.microsoft.com/office/drawing/2010/main" xmlns="" w="9525">
+              <a14:hiddenLine xmlns="" xmlns:a14="http://schemas.microsoft.com/office/drawing/2010/main" w="9525">
                 <a:solidFill>
                   <a:schemeClr val="tx1"/>
                 </a:solidFill>
@@ -3712,14 +3712,14 @@
           <a:effectLst/>
           <a:extLst>
             <a:ext uri="{909E8E84-426E-40dd-AFC4-6F175D3DCCD1}">
-              <a14:hiddenFill xmlns:a14="http://schemas.microsoft.com/office/drawing/2010/main" xmlns="">
+              <a14:hiddenFill xmlns="" xmlns:a14="http://schemas.microsoft.com/office/drawing/2010/main">
                 <a:solidFill>
                   <a:schemeClr val="accent1"/>
                 </a:solidFill>
               </a14:hiddenFill>
             </a:ext>
             <a:ext uri="{91240B29-F687-4f45-9708-019B960494DF}">
-              <a14:hiddenLine xmlns:a14="http://schemas.microsoft.com/office/drawing/2010/main" xmlns="" w="9525">
+              <a14:hiddenLine xmlns="" xmlns:a14="http://schemas.microsoft.com/office/drawing/2010/main" w="9525">
                 <a:solidFill>
                   <a:schemeClr val="bg2"/>
                 </a:solidFill>
@@ -3729,7 +3729,7 @@
               </a14:hiddenLine>
             </a:ext>
             <a:ext uri="{AF507438-7753-43e0-B8FC-AC1667EBCBE1}">
-              <a14:hiddenEffects xmlns:a14="http://schemas.microsoft.com/office/drawing/2010/main" xmlns="">
+              <a14:hiddenEffects xmlns="" xmlns:a14="http://schemas.microsoft.com/office/drawing/2010/main">
                 <a:effectLst>
                   <a:outerShdw dist="35921" dir="2700000" algn="ctr" rotWithShape="0">
                     <a:schemeClr val="bg2"/>
@@ -3800,14 +3800,14 @@
           <a:effectLst/>
           <a:extLst>
             <a:ext uri="{909E8E84-426E-40dd-AFC4-6F175D3DCCD1}">
-              <a14:hiddenFill xmlns:a14="http://schemas.microsoft.com/office/drawing/2010/main" xmlns="">
+              <a14:hiddenFill xmlns="" xmlns:a14="http://schemas.microsoft.com/office/drawing/2010/main">
                 <a:solidFill>
                   <a:schemeClr val="accent1"/>
                 </a:solidFill>
               </a14:hiddenFill>
             </a:ext>
             <a:ext uri="{91240B29-F687-4f45-9708-019B960494DF}">
-              <a14:hiddenLine xmlns:a14="http://schemas.microsoft.com/office/drawing/2010/main" xmlns="" w="9525">
+              <a14:hiddenLine xmlns="" xmlns:a14="http://schemas.microsoft.com/office/drawing/2010/main" w="9525">
                 <a:solidFill>
                   <a:schemeClr val="tx1"/>
                 </a:solidFill>
@@ -3817,7 +3817,7 @@
               </a14:hiddenLine>
             </a:ext>
             <a:ext uri="{AF507438-7753-43e0-B8FC-AC1667EBCBE1}">
-              <a14:hiddenEffects xmlns:a14="http://schemas.microsoft.com/office/drawing/2010/main" xmlns="">
+              <a14:hiddenEffects xmlns="" xmlns:a14="http://schemas.microsoft.com/office/drawing/2010/main">
                 <a:effectLst>
                   <a:outerShdw dist="35921" dir="2700000" algn="ctr" rotWithShape="0">
                     <a:schemeClr val="bg2"/>
@@ -3940,14 +3940,14 @@
           <a:effectLst/>
           <a:extLst>
             <a:ext uri="{909E8E84-426E-40dd-AFC4-6F175D3DCCD1}">
-              <a14:hiddenFill xmlns:a14="http://schemas.microsoft.com/office/drawing/2010/main" xmlns="">
+              <a14:hiddenFill xmlns="" xmlns:a14="http://schemas.microsoft.com/office/drawing/2010/main">
                 <a:solidFill>
                   <a:schemeClr val="accent1"/>
                 </a:solidFill>
               </a14:hiddenFill>
             </a:ext>
             <a:ext uri="{91240B29-F687-4f45-9708-019B960494DF}">
-              <a14:hiddenLine xmlns:a14="http://schemas.microsoft.com/office/drawing/2010/main" xmlns="" w="9525">
+              <a14:hiddenLine xmlns="" xmlns:a14="http://schemas.microsoft.com/office/drawing/2010/main" w="9525">
                 <a:solidFill>
                   <a:schemeClr val="tx1"/>
                 </a:solidFill>
@@ -3957,7 +3957,7 @@
               </a14:hiddenLine>
             </a:ext>
             <a:ext uri="{AF507438-7753-43e0-B8FC-AC1667EBCBE1}">
-              <a14:hiddenEffects xmlns:a14="http://schemas.microsoft.com/office/drawing/2010/main" xmlns="">
+              <a14:hiddenEffects xmlns="" xmlns:a14="http://schemas.microsoft.com/office/drawing/2010/main">
                 <a:effectLst>
                   <a:outerShdw dist="35921" dir="2700000" algn="ctr" rotWithShape="0">
                     <a:schemeClr val="bg2"/>
@@ -4012,14 +4012,14 @@
           <a:effectLst/>
           <a:extLst>
             <a:ext uri="{909E8E84-426E-40dd-AFC4-6F175D3DCCD1}">
-              <a14:hiddenFill xmlns:a14="http://schemas.microsoft.com/office/drawing/2010/main" xmlns="">
+              <a14:hiddenFill xmlns="" xmlns:a14="http://schemas.microsoft.com/office/drawing/2010/main">
                 <a:solidFill>
                   <a:schemeClr val="accent1"/>
                 </a:solidFill>
               </a14:hiddenFill>
             </a:ext>
             <a:ext uri="{91240B29-F687-4f45-9708-019B960494DF}">
-              <a14:hiddenLine xmlns:a14="http://schemas.microsoft.com/office/drawing/2010/main" xmlns="" w="9525">
+              <a14:hiddenLine xmlns="" xmlns:a14="http://schemas.microsoft.com/office/drawing/2010/main" w="9525">
                 <a:solidFill>
                   <a:schemeClr val="tx1"/>
                 </a:solidFill>
@@ -4029,7 +4029,7 @@
               </a14:hiddenLine>
             </a:ext>
             <a:ext uri="{AF507438-7753-43e0-B8FC-AC1667EBCBE1}">
-              <a14:hiddenEffects xmlns:a14="http://schemas.microsoft.com/office/drawing/2010/main" xmlns="">
+              <a14:hiddenEffects xmlns="" xmlns:a14="http://schemas.microsoft.com/office/drawing/2010/main">
                 <a:effectLst>
                   <a:outerShdw dist="35921" dir="2700000" algn="ctr" rotWithShape="0">
                     <a:schemeClr val="bg2"/>
@@ -4080,7 +4080,7 @@
           <a:blip r:embed="rId13" cstate="print">
             <a:extLst>
               <a:ext uri="{28A0092B-C50C-407E-A947-70E740481C1C}">
-                <a14:useLocalDpi xmlns:a14="http://schemas.microsoft.com/office/drawing/2010/main" xmlns="" val="0"/>
+                <a14:useLocalDpi xmlns="" xmlns:a14="http://schemas.microsoft.com/office/drawing/2010/main" val="0"/>
               </a:ext>
             </a:extLst>
           </a:blip>
@@ -4100,7 +4100,7 @@
           <a:noFill/>
           <a:extLst>
             <a:ext uri="{909E8E84-426E-40dd-AFC4-6F175D3DCCD1}">
-              <a14:hiddenFill xmlns:a14="http://schemas.microsoft.com/office/drawing/2010/main" xmlns="">
+              <a14:hiddenFill xmlns="" xmlns:a14="http://schemas.microsoft.com/office/drawing/2010/main">
                 <a:solidFill>
                   <a:srgbClr val="FFFFFF"/>
                 </a:solidFill>
@@ -4579,14 +4579,14 @@
           </a:ln>
           <a:extLst>
             <a:ext uri="{909E8E84-426E-40dd-AFC4-6F175D3DCCD1}">
-              <a14:hiddenFill xmlns:a14="http://schemas.microsoft.com/office/drawing/2010/main" xmlns="">
+              <a14:hiddenFill xmlns="" xmlns:a14="http://schemas.microsoft.com/office/drawing/2010/main">
                 <a:solidFill>
                   <a:srgbClr val="8AB0C6"/>
                 </a:solidFill>
               </a14:hiddenFill>
             </a:ext>
             <a:ext uri="{91240B29-F687-4f45-9708-019B960494DF}">
-              <a14:hiddenLine xmlns:a14="http://schemas.microsoft.com/office/drawing/2010/main" xmlns="" w="9525">
+              <a14:hiddenLine xmlns="" xmlns:a14="http://schemas.microsoft.com/office/drawing/2010/main" w="9525">
                 <a:solidFill>
                   <a:schemeClr val="tx1"/>
                 </a:solidFill>
@@ -4663,7 +4663,7 @@
           <a:blip r:embed="rId3" cstate="print">
             <a:extLst>
               <a:ext uri="{28A0092B-C50C-407E-A947-70E740481C1C}">
-                <a14:useLocalDpi xmlns:a14="http://schemas.microsoft.com/office/drawing/2010/main" xmlns="" val="0"/>
+                <a14:useLocalDpi xmlns="" xmlns:a14="http://schemas.microsoft.com/office/drawing/2010/main" val="0"/>
               </a:ext>
             </a:extLst>
           </a:blip>
@@ -4754,8 +4754,24 @@
           <a:lstStyle/>
           <a:p>
             <a:r>
+              <a:rPr lang="nb-NO" dirty="0" smtClean="0">
+                <a:hlinkClick r:id="rId2"/>
+              </a:rPr>
+              <a:t>Associated Google Docs File</a:t>
+            </a:r>
+            <a:endParaRPr lang="nb-NO" dirty="0" smtClean="0"/>
+          </a:p>
+          <a:p>
+            <a:endParaRPr lang="nb-NO" dirty="0" smtClean="0"/>
+          </a:p>
+          <a:p>
+            <a:r>
               <a:rPr lang="nb-NO" dirty="0" smtClean="0"/>
-              <a:t>What is STACK?</a:t>
+              <a:t>What </a:t>
+            </a:r>
+            <a:r>
+              <a:rPr lang="nb-NO" dirty="0" smtClean="0"/>
+              <a:t>is STACK?</a:t>
             </a:r>
           </a:p>
           <a:p>
@@ -4779,7 +4795,7 @@
           <p:nvPr/>
         </p:nvPicPr>
         <p:blipFill>
-          <a:blip r:embed="rId2" cstate="print"/>
+          <a:blip r:embed="rId3" cstate="print"/>
           <a:stretch>
             <a:fillRect/>
           </a:stretch>
@@ -4863,11 +4879,7 @@
             <a:pPr marL="457200" indent="-457200"/>
             <a:r>
               <a:rPr lang="en-GB" dirty="0" smtClean="0"/>
-              <a:t>Question </a:t>
-            </a:r>
-            <a:r>
-              <a:rPr lang="en-GB" dirty="0" smtClean="0"/>
-              <a:t>Name</a:t>
+              <a:t>Question Name</a:t>
             </a:r>
           </a:p>
           <a:p>
@@ -4889,11 +4901,7 @@
             <a:pPr marL="457200" indent="-457200"/>
             <a:r>
               <a:rPr lang="en-GB" dirty="0" smtClean="0"/>
-              <a:t>Question </a:t>
-            </a:r>
-            <a:r>
-              <a:rPr lang="en-GB" dirty="0" smtClean="0"/>
-              <a:t>Text</a:t>
+              <a:t>Question Text</a:t>
             </a:r>
           </a:p>
           <a:p>
@@ -4904,21 +4912,12 @@
             <a:pPr marL="457200" indent="-457200"/>
             <a:r>
               <a:rPr lang="en-GB" dirty="0" smtClean="0"/>
-              <a:t>Input (ans1)</a:t>
+              <a:t>Input (ans1</a:t>
             </a:r>
             <a:r>
               <a:rPr lang="en-GB" dirty="0" smtClean="0"/>
-              <a:t/>
-            </a:r>
-            <a:br>
-              <a:rPr lang="en-GB" dirty="0" smtClean="0"/>
-            </a:br>
-            <a:endParaRPr lang="en-GB" dirty="0" smtClean="0"/>
-          </a:p>
-          <a:p>
-            <a:endParaRPr lang="en-GB" dirty="0" smtClean="0"/>
-          </a:p>
-          <a:p>
+              <a:t>)</a:t>
+            </a:r>
             <a:endParaRPr lang="en-GB" dirty="0" smtClean="0"/>
           </a:p>
           <a:p>
@@ -5019,13 +5018,56 @@
           <a:bodyPr/>
           <a:lstStyle/>
           <a:p>
-            <a:pPr>
-              <a:buNone/>
-            </a:pPr>
+            <a:r>
+              <a:rPr lang="en-GB" dirty="0" smtClean="0"/>
+              <a:t>Nodes</a:t>
+            </a:r>
+          </a:p>
+          <a:p>
             <a:endParaRPr lang="en-GB" dirty="0" smtClean="0"/>
           </a:p>
-        </p:txBody>
-      </p:sp>
+          <a:p>
+            <a:r>
+              <a:rPr lang="en-GB" dirty="0" smtClean="0"/>
+              <a:t>True/False Feedback</a:t>
+            </a:r>
+          </a:p>
+          <a:p>
+            <a:endParaRPr lang="en-GB" dirty="0" smtClean="0"/>
+          </a:p>
+          <a:p>
+            <a:r>
+              <a:rPr lang="en-GB" dirty="0" smtClean="0"/>
+              <a:t>Testing</a:t>
+            </a:r>
+            <a:endParaRPr lang="en-GB" dirty="0" smtClean="0"/>
+          </a:p>
+        </p:txBody>
+      </p:sp>
+      <p:pic>
+        <p:nvPicPr>
+          <p:cNvPr id="6" name="Picture 5" descr="90c733a51eec2827a7788947e821b1d1.png"/>
+          <p:cNvPicPr>
+            <a:picLocks noChangeAspect="1"/>
+          </p:cNvPicPr>
+          <p:nvPr/>
+        </p:nvPicPr>
+        <p:blipFill>
+          <a:blip r:embed="rId2" cstate="print"/>
+          <a:stretch>
+            <a:fillRect/>
+          </a:stretch>
+        </p:blipFill>
+        <p:spPr>
+          <a:xfrm>
+            <a:off x="3419872" y="1313260"/>
+            <a:ext cx="5724128" cy="3813000"/>
+          </a:xfrm>
+          <a:prstGeom prst="rect">
+            <a:avLst/>
+          </a:prstGeom>
+        </p:spPr>
+      </p:pic>
     </p:spTree>
   </p:cSld>
   <p:clrMapOvr>
@@ -5918,6 +5960,19 @@
 </file>
 
 <file path=customXml/item1.xml><?xml version="1.0" encoding="utf-8"?>
+<LongProperties xmlns="http://schemas.microsoft.com/office/2006/metadata/longProperties"/>
+</file>
+
+<file path=customXml/item2.xml><?xml version="1.0" encoding="utf-8"?>
+<?mso-contentType ?>
+<FormTemplates xmlns="http://schemas.microsoft.com/sharepoint/v3/contenttype/forms">
+  <Display>DocumentLibraryForm</Display>
+  <Edit>DocumentLibraryForm</Edit>
+  <New>DocumentLibraryForm</New>
+</FormTemplates>
+</file>
+
+<file path=customXml/item3.xml><?xml version="1.0" encoding="utf-8"?>
 <?mso-contentType ?>
 <spe:Receivers xmlns:spe="http://schemas.microsoft.com/sharepoint/events">
   <Receiver>
@@ -5963,47 +6018,7 @@
 </spe:Receivers>
 </file>
 
-<file path=customXml/item2.xml><?xml version="1.0" encoding="utf-8"?>
-<?mso-contentType ?>
-<FormTemplates xmlns="http://schemas.microsoft.com/sharepoint/v3/contenttype/forms">
-  <Display>DocumentLibraryForm</Display>
-  <Edit>DocumentLibraryForm</Edit>
-  <New>DocumentLibraryForm</New>
-</FormTemplates>
-</file>
-
-<file path=customXml/item3.xml><?xml version="1.0" encoding="utf-8"?>
-<LongProperties xmlns="http://schemas.microsoft.com/office/2006/metadata/longProperties"/>
-</file>
-
 <file path=customXml/item4.xml><?xml version="1.0" encoding="utf-8"?>
-<p:properties xmlns:p="http://schemas.microsoft.com/office/2006/metadata/properties" xmlns:xsi="http://www.w3.org/2001/XMLSchema-instance" xmlns:pc="http://schemas.microsoft.com/office/infopath/2007/PartnerControls">
-  <documentManagement>
-    <PublishingExpirationDate xmlns="http://schemas.microsoft.com/sharepoint/v3" xsi:nil="true"/>
-    <PublishingStartDate xmlns="http://schemas.microsoft.com/sharepoint/v3" xsi:nil="true"/>
-    <_dlc_DocId xmlns="bddf5564-c16f-48f2-80c8-ada8b386b33d">DOKUMENT-43-1903</_dlc_DocId>
-    <_dlc_DocIdUrl xmlns="bddf5564-c16f-48f2-80c8-ada8b386b33d">
-      <Url>https://intra.uia.no/InfoService/dokumentsenter/_layouts/DocIdRedir.aspx?ID=DOKUMENT-43-1903</Url>
-      <Description>DOKUMENT-43-1903</Description>
-    </_dlc_DocIdUrl>
-    <TaxCatchAll xmlns="bddf5564-c16f-48f2-80c8-ada8b386b33d"/>
-    <Utl_x00f8_psdato xmlns="db12a32c-0d5c-40e6-ae48-5b9b94a66f8d">2014-10-30T23:00:00+00:00</Utl_x00f8_psdato>
-    <FunksjonTaxHTField0 xmlns="db12a32c-0d5c-40e6-ae48-5b9b94a66f8d">
-      <Terms xmlns="http://schemas.microsoft.com/office/infopath/2007/PartnerControls"/>
-    </FunksjonTaxHTField0>
-    <DokumenttypeTaxHTField0 xmlns="db12a32c-0d5c-40e6-ae48-5b9b94a66f8d">
-      <Terms xmlns="http://schemas.microsoft.com/office/infopath/2007/PartnerControls"/>
-    </DokumenttypeTaxHTField0>
-    <M_x00f8_tedato xmlns="db12a32c-0d5c-40e6-ae48-5b9b94a66f8d" xsi:nil="true"/>
-    <TaxKeywordTaxHTField xmlns="bddf5564-c16f-48f2-80c8-ada8b386b33d">
-      <Terms xmlns="http://schemas.microsoft.com/office/infopath/2007/PartnerControls"/>
-    </TaxKeywordTaxHTField>
-    <Visningskateogori xmlns="db12a32c-0d5c-40e6-ae48-5b9b94a66f8d" xsi:nil="true"/>
-  </documentManagement>
-</p:properties>
-</file>
-
-<file path=customXml/item5.xml><?xml version="1.0" encoding="utf-8"?>
 <ct:contentTypeSchema xmlns:ct="http://schemas.microsoft.com/office/2006/metadata/contentType" xmlns:ma="http://schemas.microsoft.com/office/2006/metadata/properties/metaAttributes" ct:_="" ma:_="" ma:contentTypeName="Dokument" ma:contentTypeID="0x01010053D9099D5622294C83497A52EF3F05BA" ma:contentTypeVersion="37" ma:contentTypeDescription="Opprett et nytt dokument." ma:contentTypeScope="" ma:versionID="5b1a17cd31657328bec90df6ee0c5931">
   <xsd:schema xmlns:xsd="http://www.w3.org/2001/XMLSchema" xmlns:xs="http://www.w3.org/2001/XMLSchema" xmlns:p="http://schemas.microsoft.com/office/2006/metadata/properties" xmlns:ns1="http://schemas.microsoft.com/sharepoint/v3" xmlns:ns2="db12a32c-0d5c-40e6-ae48-5b9b94a66f8d" xmlns:ns3="bddf5564-c16f-48f2-80c8-ada8b386b33d" targetNamespace="http://schemas.microsoft.com/office/2006/metadata/properties" ma:root="true" ma:fieldsID="d66b8a33cff5f06edce566403f03128c" ns1:_="" ns2:_="" ns3:_="">
     <xsd:import namespace="http://schemas.microsoft.com/sharepoint/v3"/>
@@ -6239,10 +6254,37 @@
 </ct:contentTypeSchema>
 </file>
 
+<file path=customXml/item5.xml><?xml version="1.0" encoding="utf-8"?>
+<p:properties xmlns:p="http://schemas.microsoft.com/office/2006/metadata/properties" xmlns:xsi="http://www.w3.org/2001/XMLSchema-instance" xmlns:pc="http://schemas.microsoft.com/office/infopath/2007/PartnerControls">
+  <documentManagement>
+    <PublishingExpirationDate xmlns="http://schemas.microsoft.com/sharepoint/v3" xsi:nil="true"/>
+    <PublishingStartDate xmlns="http://schemas.microsoft.com/sharepoint/v3" xsi:nil="true"/>
+    <_dlc_DocId xmlns="bddf5564-c16f-48f2-80c8-ada8b386b33d">DOKUMENT-43-1903</_dlc_DocId>
+    <_dlc_DocIdUrl xmlns="bddf5564-c16f-48f2-80c8-ada8b386b33d">
+      <Url>https://intra.uia.no/InfoService/dokumentsenter/_layouts/DocIdRedir.aspx?ID=DOKUMENT-43-1903</Url>
+      <Description>DOKUMENT-43-1903</Description>
+    </_dlc_DocIdUrl>
+    <TaxCatchAll xmlns="bddf5564-c16f-48f2-80c8-ada8b386b33d"/>
+    <Utl_x00f8_psdato xmlns="db12a32c-0d5c-40e6-ae48-5b9b94a66f8d">2014-10-30T23:00:00+00:00</Utl_x00f8_psdato>
+    <FunksjonTaxHTField0 xmlns="db12a32c-0d5c-40e6-ae48-5b9b94a66f8d">
+      <Terms xmlns="http://schemas.microsoft.com/office/infopath/2007/PartnerControls"/>
+    </FunksjonTaxHTField0>
+    <DokumenttypeTaxHTField0 xmlns="db12a32c-0d5c-40e6-ae48-5b9b94a66f8d">
+      <Terms xmlns="http://schemas.microsoft.com/office/infopath/2007/PartnerControls"/>
+    </DokumenttypeTaxHTField0>
+    <M_x00f8_tedato xmlns="db12a32c-0d5c-40e6-ae48-5b9b94a66f8d" xsi:nil="true"/>
+    <TaxKeywordTaxHTField xmlns="bddf5564-c16f-48f2-80c8-ada8b386b33d">
+      <Terms xmlns="http://schemas.microsoft.com/office/infopath/2007/PartnerControls"/>
+    </TaxKeywordTaxHTField>
+    <Visningskateogori xmlns="db12a32c-0d5c-40e6-ae48-5b9b94a66f8d" xsi:nil="true"/>
+  </documentManagement>
+</p:properties>
+</file>
+
 <file path=customXml/itemProps1.xml><?xml version="1.0" encoding="utf-8"?>
-<ds:datastoreItem xmlns:ds="http://schemas.openxmlformats.org/officeDocument/2006/customXml" ds:itemID="{19795977-0A7C-4503-9C09-7E7F93CD49A0}">
+<ds:datastoreItem xmlns:ds="http://schemas.openxmlformats.org/officeDocument/2006/customXml" ds:itemID="{5DD5D553-E15B-476F-AE49-4D823E6B9A95}">
   <ds:schemaRefs>
-    <ds:schemaRef ds:uri="http://schemas.microsoft.com/sharepoint/events"/>
+    <ds:schemaRef ds:uri="http://schemas.microsoft.com/office/2006/metadata/longProperties"/>
   </ds:schemaRefs>
 </ds:datastoreItem>
 </file>
@@ -6256,32 +6298,14 @@
 </file>
 
 <file path=customXml/itemProps3.xml><?xml version="1.0" encoding="utf-8"?>
-<ds:datastoreItem xmlns:ds="http://schemas.openxmlformats.org/officeDocument/2006/customXml" ds:itemID="{5DD5D553-E15B-476F-AE49-4D823E6B9A95}">
+<ds:datastoreItem xmlns:ds="http://schemas.openxmlformats.org/officeDocument/2006/customXml" ds:itemID="{19795977-0A7C-4503-9C09-7E7F93CD49A0}">
   <ds:schemaRefs>
-    <ds:schemaRef ds:uri="http://schemas.microsoft.com/office/2006/metadata/longProperties"/>
+    <ds:schemaRef ds:uri="http://schemas.microsoft.com/sharepoint/events"/>
   </ds:schemaRefs>
 </ds:datastoreItem>
 </file>
 
 <file path=customXml/itemProps4.xml><?xml version="1.0" encoding="utf-8"?>
-<ds:datastoreItem xmlns:ds="http://schemas.openxmlformats.org/officeDocument/2006/customXml" ds:itemID="{F8C7912B-0041-4623-A686-083FBD9BB56F}">
-  <ds:schemaRefs>
-    <ds:schemaRef ds:uri="http://www.w3.org/XML/1998/namespace"/>
-    <ds:schemaRef ds:uri="http://schemas.microsoft.com/office/infopath/2007/PartnerControls"/>
-    <ds:schemaRef ds:uri="http://schemas.microsoft.com/office/2006/metadata/properties"/>
-    <ds:schemaRef ds:uri="http://schemas.microsoft.com/office/2006/documentManagement/types"/>
-    <ds:schemaRef ds:uri="http://schemas.microsoft.com/sharepoint/v3"/>
-    <ds:schemaRef ds:uri="http://purl.org/dc/dcmitype/"/>
-    <ds:schemaRef ds:uri="db12a32c-0d5c-40e6-ae48-5b9b94a66f8d"/>
-    <ds:schemaRef ds:uri="bddf5564-c16f-48f2-80c8-ada8b386b33d"/>
-    <ds:schemaRef ds:uri="http://schemas.openxmlformats.org/package/2006/metadata/core-properties"/>
-    <ds:schemaRef ds:uri="http://purl.org/dc/terms/"/>
-    <ds:schemaRef ds:uri="http://purl.org/dc/elements/1.1/"/>
-  </ds:schemaRefs>
-</ds:datastoreItem>
-</file>
-
-<file path=customXml/itemProps5.xml><?xml version="1.0" encoding="utf-8"?>
 <ds:datastoreItem xmlns:ds="http://schemas.openxmlformats.org/officeDocument/2006/customXml" ds:itemID="{5B60D696-8525-464B-BBD1-632D5D855C9B}">
   <ds:schemaRefs>
     <ds:schemaRef ds:uri="http://schemas.microsoft.com/office/2006/metadata/contentType"/>
@@ -6299,4 +6323,22 @@
     <ds:schemaRef ds:uri="http://schemas.microsoft.com/internal/obd"/>
   </ds:schemaRefs>
 </ds:datastoreItem>
+</file>
+
+<file path=customXml/itemProps5.xml><?xml version="1.0" encoding="utf-8"?>
+<ds:datastoreItem xmlns:ds="http://schemas.openxmlformats.org/officeDocument/2006/customXml" ds:itemID="{F8C7912B-0041-4623-A686-083FBD9BB56F}">
+  <ds:schemaRefs>
+    <ds:schemaRef ds:uri="http://www.w3.org/XML/1998/namespace"/>
+    <ds:schemaRef ds:uri="http://schemas.microsoft.com/office/infopath/2007/PartnerControls"/>
+    <ds:schemaRef ds:uri="http://schemas.microsoft.com/office/2006/metadata/properties"/>
+    <ds:schemaRef ds:uri="http://schemas.microsoft.com/office/2006/documentManagement/types"/>
+    <ds:schemaRef ds:uri="http://schemas.microsoft.com/sharepoint/v3"/>
+    <ds:schemaRef ds:uri="http://purl.org/dc/dcmitype/"/>
+    <ds:schemaRef ds:uri="db12a32c-0d5c-40e6-ae48-5b9b94a66f8d"/>
+    <ds:schemaRef ds:uri="bddf5564-c16f-48f2-80c8-ada8b386b33d"/>
+    <ds:schemaRef ds:uri="http://schemas.openxmlformats.org/package/2006/metadata/core-properties"/>
+    <ds:schemaRef ds:uri="http://purl.org/dc/terms/"/>
+    <ds:schemaRef ds:uri="http://purl.org/dc/elements/1.1/"/>
+  </ds:schemaRefs>
+</ds:datastoreItem>
 </file>
</xml_diff>